<commit_message>
second commit: Changed some ppt docs.
</commit_message>
<xml_diff>
--- a/STUDENT MANAGEMENT SYSTEM.pptx
+++ b/STUDENT MANAGEMENT SYSTEM.pptx
@@ -112,6 +112,11 @@
       </a:defRPr>
     </a:lvl9pPr>
   </p:defaultTextStyle>
+  <p:extLst>
+    <p:ext uri="{EFAFB233-063F-42B5-8137-9DF3F51BA10A}">
+      <p15:sldGuideLst xmlns:p15="http://schemas.microsoft.com/office/powerpoint/2012/main"/>
+    </p:ext>
+  </p:extLst>
 </p:presentation>
 </file>
 
@@ -837,7 +842,7 @@
           <a:p>
             <a:fld id="{37B495E5-D31E-4EB5-89B3-36762487B277}" type="datetimeFigureOut">
               <a:rPr lang="en-US" smtClean="0"/>
-              <a:t>7/11/2022</a:t>
+              <a:t>7/13/2022</a:t>
             </a:fld>
             <a:endParaRPr lang="en-US"/>
           </a:p>
@@ -1088,7 +1093,7 @@
           <a:p>
             <a:fld id="{37B495E5-D31E-4EB5-89B3-36762487B277}" type="datetimeFigureOut">
               <a:rPr lang="en-US" smtClean="0"/>
-              <a:t>7/11/2022</a:t>
+              <a:t>7/13/2022</a:t>
             </a:fld>
             <a:endParaRPr lang="en-US"/>
           </a:p>
@@ -1402,7 +1407,7 @@
           <a:p>
             <a:fld id="{37B495E5-D31E-4EB5-89B3-36762487B277}" type="datetimeFigureOut">
               <a:rPr lang="en-US" smtClean="0"/>
-              <a:t>7/11/2022</a:t>
+              <a:t>7/13/2022</a:t>
             </a:fld>
             <a:endParaRPr lang="en-US"/>
           </a:p>
@@ -1743,7 +1748,7 @@
           <a:p>
             <a:fld id="{37B495E5-D31E-4EB5-89B3-36762487B277}" type="datetimeFigureOut">
               <a:rPr lang="en-US" smtClean="0"/>
-              <a:t>7/11/2022</a:t>
+              <a:t>7/13/2022</a:t>
             </a:fld>
             <a:endParaRPr lang="en-US"/>
           </a:p>
@@ -2057,7 +2062,7 @@
           <a:p>
             <a:fld id="{37B495E5-D31E-4EB5-89B3-36762487B277}" type="datetimeFigureOut">
               <a:rPr lang="en-US" smtClean="0"/>
-              <a:t>7/11/2022</a:t>
+              <a:t>7/13/2022</a:t>
             </a:fld>
             <a:endParaRPr lang="en-US"/>
           </a:p>
@@ -2450,7 +2455,7 @@
           <a:p>
             <a:fld id="{37B495E5-D31E-4EB5-89B3-36762487B277}" type="datetimeFigureOut">
               <a:rPr lang="en-US" smtClean="0"/>
-              <a:t>7/11/2022</a:t>
+              <a:t>7/13/2022</a:t>
             </a:fld>
             <a:endParaRPr lang="en-US"/>
           </a:p>
@@ -2620,7 +2625,7 @@
           <a:p>
             <a:fld id="{37B495E5-D31E-4EB5-89B3-36762487B277}" type="datetimeFigureOut">
               <a:rPr lang="en-US" smtClean="0"/>
-              <a:t>7/11/2022</a:t>
+              <a:t>7/13/2022</a:t>
             </a:fld>
             <a:endParaRPr lang="en-US"/>
           </a:p>
@@ -2800,7 +2805,7 @@
           <a:p>
             <a:fld id="{37B495E5-D31E-4EB5-89B3-36762487B277}" type="datetimeFigureOut">
               <a:rPr lang="en-US" smtClean="0"/>
-              <a:t>7/11/2022</a:t>
+              <a:t>7/13/2022</a:t>
             </a:fld>
             <a:endParaRPr lang="en-US"/>
           </a:p>
@@ -2976,7 +2981,7 @@
           <a:p>
             <a:fld id="{37B495E5-D31E-4EB5-89B3-36762487B277}" type="datetimeFigureOut">
               <a:rPr lang="en-US" smtClean="0"/>
-              <a:t>7/11/2022</a:t>
+              <a:t>7/13/2022</a:t>
             </a:fld>
             <a:endParaRPr lang="en-US"/>
           </a:p>
@@ -3223,7 +3228,7 @@
           <a:p>
             <a:fld id="{37B495E5-D31E-4EB5-89B3-36762487B277}" type="datetimeFigureOut">
               <a:rPr lang="en-US" smtClean="0"/>
-              <a:t>7/11/2022</a:t>
+              <a:t>7/13/2022</a:t>
             </a:fld>
             <a:endParaRPr lang="en-US"/>
           </a:p>
@@ -3455,7 +3460,7 @@
           <a:p>
             <a:fld id="{37B495E5-D31E-4EB5-89B3-36762487B277}" type="datetimeFigureOut">
               <a:rPr lang="en-US" smtClean="0"/>
-              <a:t>7/11/2022</a:t>
+              <a:t>7/13/2022</a:t>
             </a:fld>
             <a:endParaRPr lang="en-US"/>
           </a:p>
@@ -3829,7 +3834,7 @@
           <a:p>
             <a:fld id="{37B495E5-D31E-4EB5-89B3-36762487B277}" type="datetimeFigureOut">
               <a:rPr lang="en-US" smtClean="0"/>
-              <a:t>7/11/2022</a:t>
+              <a:t>7/13/2022</a:t>
             </a:fld>
             <a:endParaRPr lang="en-US"/>
           </a:p>
@@ -3952,7 +3957,7 @@
           <a:p>
             <a:fld id="{37B495E5-D31E-4EB5-89B3-36762487B277}" type="datetimeFigureOut">
               <a:rPr lang="en-US" smtClean="0"/>
-              <a:t>7/11/2022</a:t>
+              <a:t>7/13/2022</a:t>
             </a:fld>
             <a:endParaRPr lang="en-US"/>
           </a:p>
@@ -4047,7 +4052,7 @@
           <a:p>
             <a:fld id="{37B495E5-D31E-4EB5-89B3-36762487B277}" type="datetimeFigureOut">
               <a:rPr lang="en-US" smtClean="0"/>
-              <a:t>7/11/2022</a:t>
+              <a:t>7/13/2022</a:t>
             </a:fld>
             <a:endParaRPr lang="en-US"/>
           </a:p>
@@ -4302,7 +4307,7 @@
           <a:p>
             <a:fld id="{37B495E5-D31E-4EB5-89B3-36762487B277}" type="datetimeFigureOut">
               <a:rPr lang="en-US" smtClean="0"/>
-              <a:t>7/11/2022</a:t>
+              <a:t>7/13/2022</a:t>
             </a:fld>
             <a:endParaRPr lang="en-US"/>
           </a:p>
@@ -4565,7 +4570,7 @@
           <a:p>
             <a:fld id="{37B495E5-D31E-4EB5-89B3-36762487B277}" type="datetimeFigureOut">
               <a:rPr lang="en-US" smtClean="0"/>
-              <a:t>7/11/2022</a:t>
+              <a:t>7/13/2022</a:t>
             </a:fld>
             <a:endParaRPr lang="en-US"/>
           </a:p>
@@ -5308,7 +5313,7 @@
           <a:p>
             <a:fld id="{37B495E5-D31E-4EB5-89B3-36762487B277}" type="datetimeFigureOut">
               <a:rPr lang="en-US" smtClean="0"/>
-              <a:t>7/11/2022</a:t>
+              <a:t>7/13/2022</a:t>
             </a:fld>
             <a:endParaRPr lang="en-US"/>
           </a:p>
@@ -6829,7 +6834,16 @@
                 <a:latin typeface="Times New Roman" panose="02020603050405020304" pitchFamily="18" charset="0"/>
                 <a:cs typeface="Times New Roman" panose="02020603050405020304" pitchFamily="18" charset="0"/>
               </a:rPr>
-              <a:t>Get all Students</a:t>
+              <a:t>Get all Students </a:t>
+            </a:r>
+          </a:p>
+          <a:p>
+            <a:r>
+              <a:rPr lang="en-US" sz="2400" dirty="0">
+                <a:latin typeface="Times New Roman" panose="02020603050405020304" pitchFamily="18" charset="0"/>
+                <a:cs typeface="Times New Roman" panose="02020603050405020304" pitchFamily="18" charset="0"/>
+              </a:rPr>
+              <a:t>Get all Students using Pagination</a:t>
             </a:r>
           </a:p>
           <a:p>

</xml_diff>

<commit_message>
new commits in this new Branch
</commit_message>
<xml_diff>
--- a/STUDENT MANAGEMENT SYSTEM.pptx
+++ b/STUDENT MANAGEMENT SYSTEM.pptx
@@ -842,7 +842,7 @@
           <a:p>
             <a:fld id="{37B495E5-D31E-4EB5-89B3-36762487B277}" type="datetimeFigureOut">
               <a:rPr lang="en-US" smtClean="0"/>
-              <a:t>7/13/2022</a:t>
+              <a:t>7/15/2022</a:t>
             </a:fld>
             <a:endParaRPr lang="en-US"/>
           </a:p>
@@ -1093,7 +1093,7 @@
           <a:p>
             <a:fld id="{37B495E5-D31E-4EB5-89B3-36762487B277}" type="datetimeFigureOut">
               <a:rPr lang="en-US" smtClean="0"/>
-              <a:t>7/13/2022</a:t>
+              <a:t>7/15/2022</a:t>
             </a:fld>
             <a:endParaRPr lang="en-US"/>
           </a:p>
@@ -1407,7 +1407,7 @@
           <a:p>
             <a:fld id="{37B495E5-D31E-4EB5-89B3-36762487B277}" type="datetimeFigureOut">
               <a:rPr lang="en-US" smtClean="0"/>
-              <a:t>7/13/2022</a:t>
+              <a:t>7/15/2022</a:t>
             </a:fld>
             <a:endParaRPr lang="en-US"/>
           </a:p>
@@ -1748,7 +1748,7 @@
           <a:p>
             <a:fld id="{37B495E5-D31E-4EB5-89B3-36762487B277}" type="datetimeFigureOut">
               <a:rPr lang="en-US" smtClean="0"/>
-              <a:t>7/13/2022</a:t>
+              <a:t>7/15/2022</a:t>
             </a:fld>
             <a:endParaRPr lang="en-US"/>
           </a:p>
@@ -2062,7 +2062,7 @@
           <a:p>
             <a:fld id="{37B495E5-D31E-4EB5-89B3-36762487B277}" type="datetimeFigureOut">
               <a:rPr lang="en-US" smtClean="0"/>
-              <a:t>7/13/2022</a:t>
+              <a:t>7/15/2022</a:t>
             </a:fld>
             <a:endParaRPr lang="en-US"/>
           </a:p>
@@ -2455,7 +2455,7 @@
           <a:p>
             <a:fld id="{37B495E5-D31E-4EB5-89B3-36762487B277}" type="datetimeFigureOut">
               <a:rPr lang="en-US" smtClean="0"/>
-              <a:t>7/13/2022</a:t>
+              <a:t>7/15/2022</a:t>
             </a:fld>
             <a:endParaRPr lang="en-US"/>
           </a:p>
@@ -2625,7 +2625,7 @@
           <a:p>
             <a:fld id="{37B495E5-D31E-4EB5-89B3-36762487B277}" type="datetimeFigureOut">
               <a:rPr lang="en-US" smtClean="0"/>
-              <a:t>7/13/2022</a:t>
+              <a:t>7/15/2022</a:t>
             </a:fld>
             <a:endParaRPr lang="en-US"/>
           </a:p>
@@ -2805,7 +2805,7 @@
           <a:p>
             <a:fld id="{37B495E5-D31E-4EB5-89B3-36762487B277}" type="datetimeFigureOut">
               <a:rPr lang="en-US" smtClean="0"/>
-              <a:t>7/13/2022</a:t>
+              <a:t>7/15/2022</a:t>
             </a:fld>
             <a:endParaRPr lang="en-US"/>
           </a:p>
@@ -2981,7 +2981,7 @@
           <a:p>
             <a:fld id="{37B495E5-D31E-4EB5-89B3-36762487B277}" type="datetimeFigureOut">
               <a:rPr lang="en-US" smtClean="0"/>
-              <a:t>7/13/2022</a:t>
+              <a:t>7/15/2022</a:t>
             </a:fld>
             <a:endParaRPr lang="en-US"/>
           </a:p>
@@ -3228,7 +3228,7 @@
           <a:p>
             <a:fld id="{37B495E5-D31E-4EB5-89B3-36762487B277}" type="datetimeFigureOut">
               <a:rPr lang="en-US" smtClean="0"/>
-              <a:t>7/13/2022</a:t>
+              <a:t>7/15/2022</a:t>
             </a:fld>
             <a:endParaRPr lang="en-US"/>
           </a:p>
@@ -3460,7 +3460,7 @@
           <a:p>
             <a:fld id="{37B495E5-D31E-4EB5-89B3-36762487B277}" type="datetimeFigureOut">
               <a:rPr lang="en-US" smtClean="0"/>
-              <a:t>7/13/2022</a:t>
+              <a:t>7/15/2022</a:t>
             </a:fld>
             <a:endParaRPr lang="en-US"/>
           </a:p>
@@ -3834,7 +3834,7 @@
           <a:p>
             <a:fld id="{37B495E5-D31E-4EB5-89B3-36762487B277}" type="datetimeFigureOut">
               <a:rPr lang="en-US" smtClean="0"/>
-              <a:t>7/13/2022</a:t>
+              <a:t>7/15/2022</a:t>
             </a:fld>
             <a:endParaRPr lang="en-US"/>
           </a:p>
@@ -3957,7 +3957,7 @@
           <a:p>
             <a:fld id="{37B495E5-D31E-4EB5-89B3-36762487B277}" type="datetimeFigureOut">
               <a:rPr lang="en-US" smtClean="0"/>
-              <a:t>7/13/2022</a:t>
+              <a:t>7/15/2022</a:t>
             </a:fld>
             <a:endParaRPr lang="en-US"/>
           </a:p>
@@ -4052,7 +4052,7 @@
           <a:p>
             <a:fld id="{37B495E5-D31E-4EB5-89B3-36762487B277}" type="datetimeFigureOut">
               <a:rPr lang="en-US" smtClean="0"/>
-              <a:t>7/13/2022</a:t>
+              <a:t>7/15/2022</a:t>
             </a:fld>
             <a:endParaRPr lang="en-US"/>
           </a:p>
@@ -4307,7 +4307,7 @@
           <a:p>
             <a:fld id="{37B495E5-D31E-4EB5-89B3-36762487B277}" type="datetimeFigureOut">
               <a:rPr lang="en-US" smtClean="0"/>
-              <a:t>7/13/2022</a:t>
+              <a:t>7/15/2022</a:t>
             </a:fld>
             <a:endParaRPr lang="en-US"/>
           </a:p>
@@ -4570,7 +4570,7 @@
           <a:p>
             <a:fld id="{37B495E5-D31E-4EB5-89B3-36762487B277}" type="datetimeFigureOut">
               <a:rPr lang="en-US" smtClean="0"/>
-              <a:t>7/13/2022</a:t>
+              <a:t>7/15/2022</a:t>
             </a:fld>
             <a:endParaRPr lang="en-US"/>
           </a:p>
@@ -5313,7 +5313,7 @@
           <a:p>
             <a:fld id="{37B495E5-D31E-4EB5-89B3-36762487B277}" type="datetimeFigureOut">
               <a:rPr lang="en-US" smtClean="0"/>
-              <a:t>7/13/2022</a:t>
+              <a:t>7/15/2022</a:t>
             </a:fld>
             <a:endParaRPr lang="en-US"/>
           </a:p>
@@ -6975,8 +6975,21 @@
                 <a:latin typeface="Times New Roman" panose="02020603050405020304" pitchFamily="18" charset="0"/>
                 <a:cs typeface="Times New Roman" panose="02020603050405020304" pitchFamily="18" charset="0"/>
               </a:rPr>
-              <a:t>Logging provides necessary information about processes and changes for security purpose </a:t>
-            </a:r>
+              <a:t>Logging provides necessary information about processes and changes for security </a:t>
+            </a:r>
+            <a:r>
+              <a:rPr lang="en-US" sz="2400">
+                <a:latin typeface="Times New Roman" panose="02020603050405020304" pitchFamily="18" charset="0"/>
+                <a:cs typeface="Times New Roman" panose="02020603050405020304" pitchFamily="18" charset="0"/>
+              </a:rPr>
+              <a:t>purpose </a:t>
+            </a:r>
+          </a:p>
+          <a:p>
+            <a:endParaRPr lang="en-US" sz="2400" dirty="0">
+              <a:latin typeface="Times New Roman" panose="02020603050405020304" pitchFamily="18" charset="0"/>
+              <a:cs typeface="Times New Roman" panose="02020603050405020304" pitchFamily="18" charset="0"/>
+            </a:endParaRPr>
           </a:p>
         </p:txBody>
       </p:sp>

</xml_diff>